<commit_message>
Update poster and add make cnn preprocessing notebook
</commit_message>
<xml_diff>
--- a/reports/posterTemplate.pptx
+++ b/reports/posterTemplate.pptx
@@ -3854,7 +3854,7 @@
           <a:bodyPr wrap="none" lIns="90326" tIns="45161" rIns="90326" bIns="45161" anchor="ctr"/>
           <a:lstStyle/>
           <a:p>
-            <a:endParaRPr lang="ko-KR" altLang="en-US" sz="2198"/>
+            <a:endParaRPr lang="ko-KR" altLang="en-US" sz="2198" dirty="0"/>
           </a:p>
         </p:txBody>
       </p:sp>
@@ -4771,11 +4771,6 @@
               </a:rPr>
               <a:t>3</a:t>
             </a:r>
-            <a:endParaRPr lang="en-GB" altLang="ko-KR" sz="4387" baseline="30000" dirty="0">
-              <a:solidFill>
-                <a:srgbClr val="000000"/>
-              </a:solidFill>
-            </a:endParaRPr>
           </a:p>
           <a:p>
             <a:pPr algn="ctr">

</xml_diff>